<commit_message>
modify code to simplify
</commit_message>
<xml_diff>
--- a/课件/课件素材.pptx
+++ b/课件/课件素材.pptx
@@ -4726,11 +4726,7 @@
           <a:p>
             <a:r>
               <a:rPr lang="zh-CN" altLang="zh-CN"/>
-              <a:t>后</a:t>
-            </a:r>
-            <a:r>
-              <a:rPr lang="zh-CN" altLang="zh-CN"/>
-              <a:t>序遍历</a:t>
+              <a:t>后序遍历</a:t>
             </a:r>
             <a:r>
               <a:rPr lang="en-US" altLang="zh-CN"/>
@@ -16537,13 +16533,7 @@
               <a:rPr lang="en-US" altLang="zh-CN">
                 <a:sym typeface="+mn-ea"/>
               </a:rPr>
-              <a:t>: </a:t>
-            </a:r>
-            <a:r>
-              <a:rPr lang="en-US" altLang="zh-CN">
-                <a:sym typeface="+mn-ea"/>
-              </a:rPr>
-              <a:t>0-1-2-3-4-6-7-8-9-10</a:t>
+              <a:t>: 0-1-2-3-4-6-7-8-9-10</a:t>
             </a:r>
             <a:br>
               <a:rPr lang="en-US" altLang="zh-CN">
@@ -16566,13 +16556,7 @@
               <a:rPr lang="zh-CN" altLang="en-US">
                 <a:sym typeface="+mn-ea"/>
               </a:rPr>
-              <a:t>（左右中</a:t>
-            </a:r>
-            <a:r>
-              <a:rPr lang="zh-CN" altLang="en-US">
-                <a:sym typeface="+mn-ea"/>
-              </a:rPr>
-              <a:t>）</a:t>
+              <a:t>（左右中）</a:t>
             </a:r>
             <a:r>
               <a:rPr lang="en-US" altLang="zh-CN">
@@ -17429,13 +17413,7 @@
               <a:rPr lang="zh-CN" altLang="zh-CN">
                 <a:sym typeface="+mn-ea"/>
               </a:rPr>
-              <a:t>非递归</a:t>
-            </a:r>
-            <a:r>
-              <a:rPr lang="zh-CN" altLang="zh-CN">
-                <a:sym typeface="+mn-ea"/>
-              </a:rPr>
-              <a:t>前序遍历</a:t>
+              <a:t>非递归前序遍历</a:t>
             </a:r>
             <a:r>
               <a:rPr lang="en-US" altLang="zh-CN">

</xml_diff>

<commit_message>
graph topsort & unweighted OK
</commit_message>
<xml_diff>
--- a/课件/课件素材.pptx
+++ b/课件/课件素材.pptx
@@ -35,6 +35,8 @@
     <p:sldId id="302" r:id="rId28"/>
     <p:sldId id="304" r:id="rId29"/>
     <p:sldId id="303" r:id="rId30"/>
+    <p:sldId id="306" r:id="rId31"/>
+    <p:sldId id="307" r:id="rId32"/>
   </p:sldIdLst>
   <p:sldSz cx="12192000" cy="6858000"/>
   <p:notesSz cx="6858000" cy="9144000"/>
@@ -27136,11 +27138,7 @@
                 </a:br>
                 <a:r>
                   <a:rPr lang="zh-CN" altLang="ja-JP"/>
-                  <a:t>然后其左右子树入队（如果存在</a:t>
-                </a:r>
-                <a:r>
-                  <a:rPr lang="zh-CN" altLang="ja-JP"/>
-                  <a:t>）</a:t>
+                  <a:t>然后其左右子树入队（如果存在）</a:t>
                 </a:r>
                 <a:br>
                   <a:rPr lang="zh-CN" altLang="ja-JP"/>
@@ -27273,11 +27271,7 @@
             </a:r>
             <a:r>
               <a:rPr lang="zh-CN" altLang="en-US"/>
-              <a:t>直至队列</a:t>
-            </a:r>
-            <a:r>
-              <a:rPr lang="zh-CN" altLang="en-US"/>
-              <a:t>为空</a:t>
+              <a:t>直至队列为空</a:t>
             </a:r>
             <a:endParaRPr lang="zh-CN" altLang="en-US"/>
           </a:p>
@@ -33208,6 +33202,1594 @@
           </a:p>
         </p:txBody>
       </p:sp>
+    </p:spTree>
+  </p:cSld>
+  <p:clrMapOvr>
+    <a:masterClrMapping/>
+  </p:clrMapOvr>
+</p:sld>
+</file>
+
+<file path=ppt/slides/slide28.xml><?xml version="1.0" encoding="utf-8"?>
+<p:sld xmlns:a="http://schemas.openxmlformats.org/drawingml/2006/main" xmlns:r="http://schemas.openxmlformats.org/officeDocument/2006/relationships" xmlns:p="http://schemas.openxmlformats.org/presentationml/2006/main">
+  <p:cSld>
+    <p:spTree>
+      <p:nvGrpSpPr>
+        <p:cNvPr id="1" name=""/>
+        <p:cNvGrpSpPr/>
+        <p:nvPr/>
+      </p:nvGrpSpPr>
+      <p:grpSpPr/>
+      <p:sp>
+        <p:nvSpPr>
+          <p:cNvPr id="2" name="标题 1"/>
+          <p:cNvSpPr>
+            <a:spLocks noGrp="1"/>
+          </p:cNvSpPr>
+          <p:nvPr>
+            <p:ph type="title"/>
+          </p:nvPr>
+        </p:nvSpPr>
+        <p:spPr>
+          <a:xfrm>
+            <a:off x="838200" y="365125"/>
+            <a:ext cx="10515600" cy="1325563"/>
+          </a:xfrm>
+        </p:spPr>
+        <p:txBody>
+          <a:bodyPr/>
+          <a:p>
+            <a:r>
+              <a:rPr lang="zh-CN" altLang="en-US"/>
+              <a:t>拓扑排序</a:t>
+            </a:r>
+            <a:endParaRPr lang="zh-CN" altLang="en-US"/>
+          </a:p>
+        </p:txBody>
+      </p:sp>
+      <p:grpSp>
+        <p:nvGrpSpPr>
+          <p:cNvPr id="24" name="组合 23"/>
+          <p:cNvGrpSpPr/>
+          <p:nvPr/>
+        </p:nvGrpSpPr>
+        <p:grpSpPr>
+          <a:xfrm>
+            <a:off x="294005" y="1534795"/>
+            <a:ext cx="3065780" cy="2141220"/>
+            <a:chOff x="683" y="2879"/>
+            <a:chExt cx="4828" cy="3372"/>
+          </a:xfrm>
+        </p:grpSpPr>
+        <p:grpSp>
+          <p:nvGrpSpPr>
+            <p:cNvPr id="11" name="组合 10"/>
+            <p:cNvGrpSpPr/>
+            <p:nvPr/>
+          </p:nvGrpSpPr>
+          <p:grpSpPr>
+            <a:xfrm>
+              <a:off x="683" y="2879"/>
+              <a:ext cx="4829" cy="3372"/>
+              <a:chOff x="1057" y="3298"/>
+              <a:chExt cx="4829" cy="3372"/>
+            </a:xfrm>
+          </p:grpSpPr>
+          <p:sp>
+            <p:nvSpPr>
+              <p:cNvPr id="4" name="椭圆 3"/>
+              <p:cNvSpPr/>
+              <p:nvPr/>
+            </p:nvSpPr>
+            <p:spPr>
+              <a:xfrm>
+                <a:off x="2311" y="3298"/>
+                <a:ext cx="727" cy="727"/>
+              </a:xfrm>
+              <a:prstGeom prst="ellipse">
+                <a:avLst/>
+              </a:prstGeom>
+            </p:spPr>
+            <p:style>
+              <a:lnRef idx="2">
+                <a:schemeClr val="accent1"/>
+              </a:lnRef>
+              <a:fillRef idx="1">
+                <a:schemeClr val="lt1"/>
+              </a:fillRef>
+              <a:effectRef idx="0">
+                <a:schemeClr val="accent1"/>
+              </a:effectRef>
+              <a:fontRef idx="minor">
+                <a:schemeClr val="dk1"/>
+              </a:fontRef>
+            </p:style>
+            <p:txBody>
+              <a:bodyPr rtlCol="0" anchor="ctr"/>
+              <a:p>
+                <a:pPr algn="ctr"/>
+                <a:r>
+                  <a:rPr lang="en-US" altLang="zh-CN"/>
+                  <a:t>0</a:t>
+                </a:r>
+                <a:endParaRPr lang="en-US" altLang="zh-CN"/>
+              </a:p>
+            </p:txBody>
+          </p:sp>
+          <p:sp>
+            <p:nvSpPr>
+              <p:cNvPr id="5" name="椭圆 4"/>
+              <p:cNvSpPr/>
+              <p:nvPr/>
+            </p:nvSpPr>
+            <p:spPr>
+              <a:xfrm>
+                <a:off x="1057" y="4625"/>
+                <a:ext cx="727" cy="727"/>
+              </a:xfrm>
+              <a:prstGeom prst="ellipse">
+                <a:avLst/>
+              </a:prstGeom>
+            </p:spPr>
+            <p:style>
+              <a:lnRef idx="2">
+                <a:schemeClr val="accent1"/>
+              </a:lnRef>
+              <a:fillRef idx="1">
+                <a:schemeClr val="lt1"/>
+              </a:fillRef>
+              <a:effectRef idx="0">
+                <a:schemeClr val="accent1"/>
+              </a:effectRef>
+              <a:fontRef idx="minor">
+                <a:schemeClr val="dk1"/>
+              </a:fontRef>
+            </p:style>
+            <p:txBody>
+              <a:bodyPr rtlCol="0" anchor="ctr"/>
+              <a:p>
+                <a:pPr algn="ctr"/>
+                <a:r>
+                  <a:rPr lang="en-US" altLang="zh-CN"/>
+                  <a:t>2</a:t>
+                </a:r>
+                <a:endParaRPr lang="en-US" altLang="zh-CN"/>
+              </a:p>
+            </p:txBody>
+          </p:sp>
+          <p:sp>
+            <p:nvSpPr>
+              <p:cNvPr id="6" name="椭圆 5"/>
+              <p:cNvSpPr/>
+              <p:nvPr/>
+            </p:nvSpPr>
+            <p:spPr>
+              <a:xfrm>
+                <a:off x="4099" y="3298"/>
+                <a:ext cx="727" cy="727"/>
+              </a:xfrm>
+              <a:prstGeom prst="ellipse">
+                <a:avLst/>
+              </a:prstGeom>
+            </p:spPr>
+            <p:style>
+              <a:lnRef idx="2">
+                <a:schemeClr val="accent1"/>
+              </a:lnRef>
+              <a:fillRef idx="1">
+                <a:schemeClr val="lt1"/>
+              </a:fillRef>
+              <a:effectRef idx="0">
+                <a:schemeClr val="accent1"/>
+              </a:effectRef>
+              <a:fontRef idx="minor">
+                <a:schemeClr val="dk1"/>
+              </a:fontRef>
+            </p:style>
+            <p:txBody>
+              <a:bodyPr rtlCol="0" anchor="ctr"/>
+              <a:p>
+                <a:pPr algn="ctr"/>
+                <a:r>
+                  <a:rPr lang="en-US" altLang="zh-CN"/>
+                  <a:t>1</a:t>
+                </a:r>
+                <a:endParaRPr lang="en-US" altLang="zh-CN"/>
+              </a:p>
+            </p:txBody>
+          </p:sp>
+          <p:sp>
+            <p:nvSpPr>
+              <p:cNvPr id="7" name="椭圆 6"/>
+              <p:cNvSpPr/>
+              <p:nvPr/>
+            </p:nvSpPr>
+            <p:spPr>
+              <a:xfrm>
+                <a:off x="2311" y="5944"/>
+                <a:ext cx="727" cy="727"/>
+              </a:xfrm>
+              <a:prstGeom prst="ellipse">
+                <a:avLst/>
+              </a:prstGeom>
+            </p:spPr>
+            <p:style>
+              <a:lnRef idx="2">
+                <a:schemeClr val="accent1"/>
+              </a:lnRef>
+              <a:fillRef idx="1">
+                <a:schemeClr val="lt1"/>
+              </a:fillRef>
+              <a:effectRef idx="0">
+                <a:schemeClr val="accent1"/>
+              </a:effectRef>
+              <a:fontRef idx="minor">
+                <a:schemeClr val="dk1"/>
+              </a:fontRef>
+            </p:style>
+            <p:txBody>
+              <a:bodyPr rtlCol="0" anchor="ctr"/>
+              <a:p>
+                <a:pPr algn="ctr"/>
+                <a:r>
+                  <a:rPr lang="en-US" altLang="zh-CN"/>
+                  <a:t>5</a:t>
+                </a:r>
+                <a:endParaRPr lang="en-US" altLang="zh-CN"/>
+              </a:p>
+            </p:txBody>
+          </p:sp>
+          <p:sp>
+            <p:nvSpPr>
+              <p:cNvPr id="8" name="椭圆 7"/>
+              <p:cNvSpPr/>
+              <p:nvPr/>
+            </p:nvSpPr>
+            <p:spPr>
+              <a:xfrm>
+                <a:off x="4099" y="5944"/>
+                <a:ext cx="727" cy="727"/>
+              </a:xfrm>
+              <a:prstGeom prst="ellipse">
+                <a:avLst/>
+              </a:prstGeom>
+            </p:spPr>
+            <p:style>
+              <a:lnRef idx="2">
+                <a:schemeClr val="accent1"/>
+              </a:lnRef>
+              <a:fillRef idx="1">
+                <a:schemeClr val="lt1"/>
+              </a:fillRef>
+              <a:effectRef idx="0">
+                <a:schemeClr val="accent1"/>
+              </a:effectRef>
+              <a:fontRef idx="minor">
+                <a:schemeClr val="dk1"/>
+              </a:fontRef>
+            </p:style>
+            <p:txBody>
+              <a:bodyPr rtlCol="0" anchor="ctr"/>
+              <a:p>
+                <a:pPr algn="ctr"/>
+                <a:r>
+                  <a:rPr lang="en-US" altLang="zh-CN"/>
+                  <a:t>6</a:t>
+                </a:r>
+                <a:endParaRPr lang="en-US" altLang="zh-CN"/>
+              </a:p>
+            </p:txBody>
+          </p:sp>
+          <p:sp>
+            <p:nvSpPr>
+              <p:cNvPr id="9" name="椭圆 8"/>
+              <p:cNvSpPr/>
+              <p:nvPr/>
+            </p:nvSpPr>
+            <p:spPr>
+              <a:xfrm>
+                <a:off x="5160" y="4625"/>
+                <a:ext cx="727" cy="727"/>
+              </a:xfrm>
+              <a:prstGeom prst="ellipse">
+                <a:avLst/>
+              </a:prstGeom>
+            </p:spPr>
+            <p:style>
+              <a:lnRef idx="2">
+                <a:schemeClr val="accent1"/>
+              </a:lnRef>
+              <a:fillRef idx="1">
+                <a:schemeClr val="lt1"/>
+              </a:fillRef>
+              <a:effectRef idx="0">
+                <a:schemeClr val="accent1"/>
+              </a:effectRef>
+              <a:fontRef idx="minor">
+                <a:schemeClr val="dk1"/>
+              </a:fontRef>
+            </p:style>
+            <p:txBody>
+              <a:bodyPr rtlCol="0" anchor="ctr"/>
+              <a:p>
+                <a:pPr algn="ctr"/>
+                <a:r>
+                  <a:rPr lang="en-US" altLang="zh-CN"/>
+                  <a:t>4</a:t>
+                </a:r>
+                <a:endParaRPr lang="en-US" altLang="zh-CN"/>
+              </a:p>
+            </p:txBody>
+          </p:sp>
+          <p:sp>
+            <p:nvSpPr>
+              <p:cNvPr id="10" name="椭圆 9"/>
+              <p:cNvSpPr/>
+              <p:nvPr/>
+            </p:nvSpPr>
+            <p:spPr>
+              <a:xfrm>
+                <a:off x="3175" y="4625"/>
+                <a:ext cx="727" cy="727"/>
+              </a:xfrm>
+              <a:prstGeom prst="ellipse">
+                <a:avLst/>
+              </a:prstGeom>
+            </p:spPr>
+            <p:style>
+              <a:lnRef idx="2">
+                <a:schemeClr val="accent1"/>
+              </a:lnRef>
+              <a:fillRef idx="1">
+                <a:schemeClr val="lt1"/>
+              </a:fillRef>
+              <a:effectRef idx="0">
+                <a:schemeClr val="accent1"/>
+              </a:effectRef>
+              <a:fontRef idx="minor">
+                <a:schemeClr val="dk1"/>
+              </a:fontRef>
+            </p:style>
+            <p:txBody>
+              <a:bodyPr rtlCol="0" anchor="ctr"/>
+              <a:p>
+                <a:pPr algn="ctr"/>
+                <a:r>
+                  <a:rPr lang="en-US" altLang="zh-CN"/>
+                  <a:t>3</a:t>
+                </a:r>
+                <a:endParaRPr lang="en-US" altLang="zh-CN"/>
+              </a:p>
+            </p:txBody>
+          </p:sp>
+        </p:grpSp>
+        <p:cxnSp>
+          <p:nvCxnSpPr>
+            <p:cNvPr id="12" name="直接箭头连接符 11"/>
+            <p:cNvCxnSpPr>
+              <a:stCxn id="4" idx="6"/>
+              <a:endCxn id="6" idx="2"/>
+            </p:cNvCxnSpPr>
+            <p:nvPr/>
+          </p:nvCxnSpPr>
+          <p:spPr>
+            <a:xfrm>
+              <a:off x="2664" y="3243"/>
+              <a:ext cx="1061" cy="0"/>
+            </a:xfrm>
+            <a:prstGeom prst="straightConnector1">
+              <a:avLst/>
+            </a:prstGeom>
+            <a:ln w="38100">
+              <a:tailEnd type="arrow"/>
+            </a:ln>
+          </p:spPr>
+          <p:style>
+            <a:lnRef idx="1">
+              <a:schemeClr val="accent1"/>
+            </a:lnRef>
+            <a:fillRef idx="0">
+              <a:schemeClr val="accent1"/>
+            </a:fillRef>
+            <a:effectRef idx="0">
+              <a:schemeClr val="accent1"/>
+            </a:effectRef>
+            <a:fontRef idx="minor">
+              <a:schemeClr val="tx1"/>
+            </a:fontRef>
+          </p:style>
+        </p:cxnSp>
+        <p:cxnSp>
+          <p:nvCxnSpPr>
+            <p:cNvPr id="13" name="直接箭头连接符 12"/>
+            <p:cNvCxnSpPr>
+              <a:stCxn id="6" idx="5"/>
+              <a:endCxn id="9" idx="1"/>
+            </p:cNvCxnSpPr>
+            <p:nvPr/>
+          </p:nvCxnSpPr>
+          <p:spPr>
+            <a:xfrm>
+              <a:off x="4346" y="3500"/>
+              <a:ext cx="546" cy="812"/>
+            </a:xfrm>
+            <a:prstGeom prst="straightConnector1">
+              <a:avLst/>
+            </a:prstGeom>
+            <a:ln w="38100">
+              <a:tailEnd type="arrow"/>
+            </a:ln>
+          </p:spPr>
+          <p:style>
+            <a:lnRef idx="1">
+              <a:schemeClr val="accent1"/>
+            </a:lnRef>
+            <a:fillRef idx="0">
+              <a:schemeClr val="accent1"/>
+            </a:fillRef>
+            <a:effectRef idx="0">
+              <a:schemeClr val="accent1"/>
+            </a:effectRef>
+            <a:fontRef idx="minor">
+              <a:schemeClr val="tx1"/>
+            </a:fontRef>
+          </p:style>
+        </p:cxnSp>
+        <p:cxnSp>
+          <p:nvCxnSpPr>
+            <p:cNvPr id="14" name="直接箭头连接符 13"/>
+            <p:cNvCxnSpPr>
+              <a:stCxn id="6" idx="3"/>
+              <a:endCxn id="10" idx="7"/>
+            </p:cNvCxnSpPr>
+            <p:nvPr/>
+          </p:nvCxnSpPr>
+          <p:spPr>
+            <a:xfrm flipH="1">
+              <a:off x="3422" y="3500"/>
+              <a:ext cx="409" cy="812"/>
+            </a:xfrm>
+            <a:prstGeom prst="straightConnector1">
+              <a:avLst/>
+            </a:prstGeom>
+            <a:ln w="38100">
+              <a:tailEnd type="arrow"/>
+            </a:ln>
+          </p:spPr>
+          <p:style>
+            <a:lnRef idx="1">
+              <a:schemeClr val="accent1"/>
+            </a:lnRef>
+            <a:fillRef idx="0">
+              <a:schemeClr val="accent1"/>
+            </a:fillRef>
+            <a:effectRef idx="0">
+              <a:schemeClr val="accent1"/>
+            </a:effectRef>
+            <a:fontRef idx="minor">
+              <a:schemeClr val="tx1"/>
+            </a:fontRef>
+          </p:style>
+        </p:cxnSp>
+        <p:cxnSp>
+          <p:nvCxnSpPr>
+            <p:cNvPr id="15" name="直接箭头连接符 14"/>
+            <p:cNvCxnSpPr>
+              <a:stCxn id="4" idx="3"/>
+              <a:endCxn id="5" idx="7"/>
+            </p:cNvCxnSpPr>
+            <p:nvPr/>
+          </p:nvCxnSpPr>
+          <p:spPr>
+            <a:xfrm flipH="1">
+              <a:off x="1304" y="3500"/>
+              <a:ext cx="739" cy="812"/>
+            </a:xfrm>
+            <a:prstGeom prst="straightConnector1">
+              <a:avLst/>
+            </a:prstGeom>
+            <a:ln w="38100">
+              <a:tailEnd type="arrow"/>
+            </a:ln>
+          </p:spPr>
+          <p:style>
+            <a:lnRef idx="1">
+              <a:schemeClr val="accent1"/>
+            </a:lnRef>
+            <a:fillRef idx="0">
+              <a:schemeClr val="accent1"/>
+            </a:fillRef>
+            <a:effectRef idx="0">
+              <a:schemeClr val="accent1"/>
+            </a:effectRef>
+            <a:fontRef idx="minor">
+              <a:schemeClr val="tx1"/>
+            </a:fontRef>
+          </p:style>
+        </p:cxnSp>
+        <p:cxnSp>
+          <p:nvCxnSpPr>
+            <p:cNvPr id="16" name="直接箭头连接符 15"/>
+            <p:cNvCxnSpPr>
+              <a:stCxn id="4" idx="5"/>
+              <a:endCxn id="10" idx="1"/>
+            </p:cNvCxnSpPr>
+            <p:nvPr/>
+          </p:nvCxnSpPr>
+          <p:spPr>
+            <a:xfrm>
+              <a:off x="2558" y="3500"/>
+              <a:ext cx="349" cy="812"/>
+            </a:xfrm>
+            <a:prstGeom prst="straightConnector1">
+              <a:avLst/>
+            </a:prstGeom>
+            <a:ln w="38100">
+              <a:tailEnd type="arrow"/>
+            </a:ln>
+          </p:spPr>
+          <p:style>
+            <a:lnRef idx="1">
+              <a:schemeClr val="accent1"/>
+            </a:lnRef>
+            <a:fillRef idx="0">
+              <a:schemeClr val="accent1"/>
+            </a:fillRef>
+            <a:effectRef idx="0">
+              <a:schemeClr val="accent1"/>
+            </a:effectRef>
+            <a:fontRef idx="minor">
+              <a:schemeClr val="tx1"/>
+            </a:fontRef>
+          </p:style>
+        </p:cxnSp>
+        <p:cxnSp>
+          <p:nvCxnSpPr>
+            <p:cNvPr id="17" name="直接箭头连接符 16"/>
+            <p:cNvCxnSpPr>
+              <a:stCxn id="10" idx="2"/>
+              <a:endCxn id="5" idx="6"/>
+            </p:cNvCxnSpPr>
+            <p:nvPr/>
+          </p:nvCxnSpPr>
+          <p:spPr>
+            <a:xfrm flipH="1">
+              <a:off x="1410" y="4570"/>
+              <a:ext cx="1391" cy="0"/>
+            </a:xfrm>
+            <a:prstGeom prst="straightConnector1">
+              <a:avLst/>
+            </a:prstGeom>
+            <a:ln w="38100">
+              <a:tailEnd type="arrow"/>
+            </a:ln>
+          </p:spPr>
+          <p:style>
+            <a:lnRef idx="1">
+              <a:schemeClr val="accent1"/>
+            </a:lnRef>
+            <a:fillRef idx="0">
+              <a:schemeClr val="accent1"/>
+            </a:fillRef>
+            <a:effectRef idx="0">
+              <a:schemeClr val="accent1"/>
+            </a:effectRef>
+            <a:fontRef idx="minor">
+              <a:schemeClr val="tx1"/>
+            </a:fontRef>
+          </p:style>
+        </p:cxnSp>
+        <p:cxnSp>
+          <p:nvCxnSpPr>
+            <p:cNvPr id="18" name="直接箭头连接符 17"/>
+            <p:cNvCxnSpPr>
+              <a:stCxn id="10" idx="3"/>
+              <a:endCxn id="7" idx="7"/>
+            </p:cNvCxnSpPr>
+            <p:nvPr/>
+          </p:nvCxnSpPr>
+          <p:spPr>
+            <a:xfrm flipH="1">
+              <a:off x="2558" y="4827"/>
+              <a:ext cx="349" cy="804"/>
+            </a:xfrm>
+            <a:prstGeom prst="straightConnector1">
+              <a:avLst/>
+            </a:prstGeom>
+            <a:ln w="38100">
+              <a:tailEnd type="arrow"/>
+            </a:ln>
+          </p:spPr>
+          <p:style>
+            <a:lnRef idx="1">
+              <a:schemeClr val="accent1"/>
+            </a:lnRef>
+            <a:fillRef idx="0">
+              <a:schemeClr val="accent1"/>
+            </a:fillRef>
+            <a:effectRef idx="0">
+              <a:schemeClr val="accent1"/>
+            </a:effectRef>
+            <a:fontRef idx="minor">
+              <a:schemeClr val="tx1"/>
+            </a:fontRef>
+          </p:style>
+        </p:cxnSp>
+        <p:cxnSp>
+          <p:nvCxnSpPr>
+            <p:cNvPr id="19" name="直接箭头连接符 18"/>
+            <p:cNvCxnSpPr>
+              <a:stCxn id="10" idx="5"/>
+              <a:endCxn id="8" idx="1"/>
+            </p:cNvCxnSpPr>
+            <p:nvPr/>
+          </p:nvCxnSpPr>
+          <p:spPr>
+            <a:xfrm>
+              <a:off x="3422" y="4827"/>
+              <a:ext cx="409" cy="804"/>
+            </a:xfrm>
+            <a:prstGeom prst="straightConnector1">
+              <a:avLst/>
+            </a:prstGeom>
+            <a:ln w="38100">
+              <a:tailEnd type="arrow"/>
+            </a:ln>
+          </p:spPr>
+          <p:style>
+            <a:lnRef idx="1">
+              <a:schemeClr val="accent1"/>
+            </a:lnRef>
+            <a:fillRef idx="0">
+              <a:schemeClr val="accent1"/>
+            </a:fillRef>
+            <a:effectRef idx="0">
+              <a:schemeClr val="accent1"/>
+            </a:effectRef>
+            <a:fontRef idx="minor">
+              <a:schemeClr val="tx1"/>
+            </a:fontRef>
+          </p:style>
+        </p:cxnSp>
+        <p:cxnSp>
+          <p:nvCxnSpPr>
+            <p:cNvPr id="20" name="直接箭头连接符 19"/>
+            <p:cNvCxnSpPr>
+              <a:stCxn id="8" idx="2"/>
+              <a:endCxn id="7" idx="6"/>
+            </p:cNvCxnSpPr>
+            <p:nvPr/>
+          </p:nvCxnSpPr>
+          <p:spPr>
+            <a:xfrm flipH="1">
+              <a:off x="2664" y="5889"/>
+              <a:ext cx="1061" cy="0"/>
+            </a:xfrm>
+            <a:prstGeom prst="straightConnector1">
+              <a:avLst/>
+            </a:prstGeom>
+            <a:ln w="38100">
+              <a:tailEnd type="arrow"/>
+            </a:ln>
+          </p:spPr>
+          <p:style>
+            <a:lnRef idx="1">
+              <a:schemeClr val="accent1"/>
+            </a:lnRef>
+            <a:fillRef idx="0">
+              <a:schemeClr val="accent1"/>
+            </a:fillRef>
+            <a:effectRef idx="0">
+              <a:schemeClr val="accent1"/>
+            </a:effectRef>
+            <a:fontRef idx="minor">
+              <a:schemeClr val="tx1"/>
+            </a:fontRef>
+          </p:style>
+        </p:cxnSp>
+        <p:cxnSp>
+          <p:nvCxnSpPr>
+            <p:cNvPr id="21" name="直接箭头连接符 20"/>
+            <p:cNvCxnSpPr>
+              <a:stCxn id="9" idx="3"/>
+              <a:endCxn id="8" idx="7"/>
+            </p:cNvCxnSpPr>
+            <p:nvPr/>
+          </p:nvCxnSpPr>
+          <p:spPr>
+            <a:xfrm flipH="1">
+              <a:off x="4346" y="4827"/>
+              <a:ext cx="546" cy="804"/>
+            </a:xfrm>
+            <a:prstGeom prst="straightConnector1">
+              <a:avLst/>
+            </a:prstGeom>
+            <a:ln w="38100">
+              <a:tailEnd type="arrow"/>
+            </a:ln>
+          </p:spPr>
+          <p:style>
+            <a:lnRef idx="1">
+              <a:schemeClr val="accent1"/>
+            </a:lnRef>
+            <a:fillRef idx="0">
+              <a:schemeClr val="accent1"/>
+            </a:fillRef>
+            <a:effectRef idx="0">
+              <a:schemeClr val="accent1"/>
+            </a:effectRef>
+            <a:fontRef idx="minor">
+              <a:schemeClr val="tx1"/>
+            </a:fontRef>
+          </p:style>
+        </p:cxnSp>
+        <p:cxnSp>
+          <p:nvCxnSpPr>
+            <p:cNvPr id="22" name="直接箭头连接符 21"/>
+            <p:cNvCxnSpPr>
+              <a:stCxn id="9" idx="2"/>
+              <a:endCxn id="10" idx="6"/>
+            </p:cNvCxnSpPr>
+            <p:nvPr/>
+          </p:nvCxnSpPr>
+          <p:spPr>
+            <a:xfrm flipH="1">
+              <a:off x="3528" y="4570"/>
+              <a:ext cx="1258" cy="0"/>
+            </a:xfrm>
+            <a:prstGeom prst="straightConnector1">
+              <a:avLst/>
+            </a:prstGeom>
+            <a:ln w="38100">
+              <a:tailEnd type="arrow"/>
+            </a:ln>
+          </p:spPr>
+          <p:style>
+            <a:lnRef idx="1">
+              <a:schemeClr val="accent1"/>
+            </a:lnRef>
+            <a:fillRef idx="0">
+              <a:schemeClr val="accent1"/>
+            </a:fillRef>
+            <a:effectRef idx="0">
+              <a:schemeClr val="accent1"/>
+            </a:effectRef>
+            <a:fontRef idx="minor">
+              <a:schemeClr val="tx1"/>
+            </a:fontRef>
+          </p:style>
+        </p:cxnSp>
+        <p:cxnSp>
+          <p:nvCxnSpPr>
+            <p:cNvPr id="23" name="直接箭头连接符 22"/>
+            <p:cNvCxnSpPr>
+              <a:stCxn id="5" idx="5"/>
+              <a:endCxn id="7" idx="1"/>
+            </p:cNvCxnSpPr>
+            <p:nvPr/>
+          </p:nvCxnSpPr>
+          <p:spPr>
+            <a:xfrm>
+              <a:off x="1304" y="4827"/>
+              <a:ext cx="739" cy="804"/>
+            </a:xfrm>
+            <a:prstGeom prst="straightConnector1">
+              <a:avLst/>
+            </a:prstGeom>
+            <a:ln w="38100">
+              <a:tailEnd type="arrow"/>
+            </a:ln>
+          </p:spPr>
+          <p:style>
+            <a:lnRef idx="1">
+              <a:schemeClr val="accent1"/>
+            </a:lnRef>
+            <a:fillRef idx="0">
+              <a:schemeClr val="accent1"/>
+            </a:fillRef>
+            <a:effectRef idx="0">
+              <a:schemeClr val="accent1"/>
+            </a:effectRef>
+            <a:fontRef idx="minor">
+              <a:schemeClr val="tx1"/>
+            </a:fontRef>
+          </p:style>
+        </p:cxnSp>
+      </p:grpSp>
+    </p:spTree>
+  </p:cSld>
+  <p:clrMapOvr>
+    <a:masterClrMapping/>
+  </p:clrMapOvr>
+</p:sld>
+</file>
+
+<file path=ppt/slides/slide29.xml><?xml version="1.0" encoding="utf-8"?>
+<p:sld xmlns:a="http://schemas.openxmlformats.org/drawingml/2006/main" xmlns:r="http://schemas.openxmlformats.org/officeDocument/2006/relationships" xmlns:p="http://schemas.openxmlformats.org/presentationml/2006/main">
+  <p:cSld>
+    <p:spTree>
+      <p:nvGrpSpPr>
+        <p:cNvPr id="1" name=""/>
+        <p:cNvGrpSpPr/>
+        <p:nvPr/>
+      </p:nvGrpSpPr>
+      <p:grpSpPr/>
+      <p:sp>
+        <p:nvSpPr>
+          <p:cNvPr id="2" name="标题 1"/>
+          <p:cNvSpPr>
+            <a:spLocks noGrp="1"/>
+          </p:cNvSpPr>
+          <p:nvPr>
+            <p:ph type="title"/>
+          </p:nvPr>
+        </p:nvSpPr>
+        <p:spPr>
+          <a:xfrm>
+            <a:off x="838200" y="365125"/>
+            <a:ext cx="10515600" cy="1325563"/>
+          </a:xfrm>
+        </p:spPr>
+        <p:txBody>
+          <a:bodyPr/>
+          <a:p>
+            <a:r>
+              <a:rPr lang="zh-CN" altLang="en-US"/>
+              <a:t>无权最短路径</a:t>
+            </a:r>
+            <a:endParaRPr lang="zh-CN" altLang="en-US"/>
+          </a:p>
+        </p:txBody>
+      </p:sp>
+      <p:grpSp>
+        <p:nvGrpSpPr>
+          <p:cNvPr id="24" name="组合 23"/>
+          <p:cNvGrpSpPr/>
+          <p:nvPr/>
+        </p:nvGrpSpPr>
+        <p:grpSpPr>
+          <a:xfrm>
+            <a:off x="294005" y="2527300"/>
+            <a:ext cx="3066415" cy="2141220"/>
+            <a:chOff x="683" y="2879"/>
+            <a:chExt cx="4829" cy="3372"/>
+          </a:xfrm>
+        </p:grpSpPr>
+        <p:grpSp>
+          <p:nvGrpSpPr>
+            <p:cNvPr id="11" name="组合 10"/>
+            <p:cNvGrpSpPr/>
+            <p:nvPr/>
+          </p:nvGrpSpPr>
+          <p:grpSpPr>
+            <a:xfrm>
+              <a:off x="683" y="2879"/>
+              <a:ext cx="4829" cy="3372"/>
+              <a:chOff x="1057" y="3298"/>
+              <a:chExt cx="4829" cy="3372"/>
+            </a:xfrm>
+          </p:grpSpPr>
+          <p:sp>
+            <p:nvSpPr>
+              <p:cNvPr id="4" name="椭圆 3"/>
+              <p:cNvSpPr/>
+              <p:nvPr/>
+            </p:nvSpPr>
+            <p:spPr>
+              <a:xfrm>
+                <a:off x="2311" y="3298"/>
+                <a:ext cx="727" cy="727"/>
+              </a:xfrm>
+              <a:prstGeom prst="ellipse">
+                <a:avLst/>
+              </a:prstGeom>
+            </p:spPr>
+            <p:style>
+              <a:lnRef idx="2">
+                <a:schemeClr val="accent1"/>
+              </a:lnRef>
+              <a:fillRef idx="1">
+                <a:schemeClr val="lt1"/>
+              </a:fillRef>
+              <a:effectRef idx="0">
+                <a:schemeClr val="accent1"/>
+              </a:effectRef>
+              <a:fontRef idx="minor">
+                <a:schemeClr val="dk1"/>
+              </a:fontRef>
+            </p:style>
+            <p:txBody>
+              <a:bodyPr rtlCol="0" anchor="ctr"/>
+              <a:p>
+                <a:pPr algn="ctr"/>
+                <a:r>
+                  <a:rPr lang="en-US" altLang="zh-CN"/>
+                  <a:t>0</a:t>
+                </a:r>
+                <a:endParaRPr lang="en-US" altLang="zh-CN"/>
+              </a:p>
+            </p:txBody>
+          </p:sp>
+          <p:sp>
+            <p:nvSpPr>
+              <p:cNvPr id="5" name="椭圆 4"/>
+              <p:cNvSpPr/>
+              <p:nvPr/>
+            </p:nvSpPr>
+            <p:spPr>
+              <a:xfrm>
+                <a:off x="1057" y="4625"/>
+                <a:ext cx="727" cy="727"/>
+              </a:xfrm>
+              <a:prstGeom prst="ellipse">
+                <a:avLst/>
+              </a:prstGeom>
+            </p:spPr>
+            <p:style>
+              <a:lnRef idx="2">
+                <a:schemeClr val="accent1"/>
+              </a:lnRef>
+              <a:fillRef idx="1">
+                <a:schemeClr val="lt1"/>
+              </a:fillRef>
+              <a:effectRef idx="0">
+                <a:schemeClr val="accent1"/>
+              </a:effectRef>
+              <a:fontRef idx="minor">
+                <a:schemeClr val="dk1"/>
+              </a:fontRef>
+            </p:style>
+            <p:txBody>
+              <a:bodyPr rtlCol="0" anchor="ctr"/>
+              <a:p>
+                <a:pPr algn="ctr"/>
+                <a:r>
+                  <a:rPr lang="en-US" altLang="zh-CN"/>
+                  <a:t>2</a:t>
+                </a:r>
+                <a:endParaRPr lang="en-US" altLang="zh-CN"/>
+              </a:p>
+            </p:txBody>
+          </p:sp>
+          <p:sp>
+            <p:nvSpPr>
+              <p:cNvPr id="6" name="椭圆 5"/>
+              <p:cNvSpPr/>
+              <p:nvPr/>
+            </p:nvSpPr>
+            <p:spPr>
+              <a:xfrm>
+                <a:off x="4099" y="3298"/>
+                <a:ext cx="727" cy="727"/>
+              </a:xfrm>
+              <a:prstGeom prst="ellipse">
+                <a:avLst/>
+              </a:prstGeom>
+            </p:spPr>
+            <p:style>
+              <a:lnRef idx="2">
+                <a:schemeClr val="accent1"/>
+              </a:lnRef>
+              <a:fillRef idx="1">
+                <a:schemeClr val="lt1"/>
+              </a:fillRef>
+              <a:effectRef idx="0">
+                <a:schemeClr val="accent1"/>
+              </a:effectRef>
+              <a:fontRef idx="minor">
+                <a:schemeClr val="dk1"/>
+              </a:fontRef>
+            </p:style>
+            <p:txBody>
+              <a:bodyPr rtlCol="0" anchor="ctr"/>
+              <a:p>
+                <a:pPr algn="ctr"/>
+                <a:r>
+                  <a:rPr lang="en-US" altLang="zh-CN"/>
+                  <a:t>1</a:t>
+                </a:r>
+                <a:endParaRPr lang="en-US" altLang="zh-CN"/>
+              </a:p>
+            </p:txBody>
+          </p:sp>
+          <p:sp>
+            <p:nvSpPr>
+              <p:cNvPr id="7" name="椭圆 6"/>
+              <p:cNvSpPr/>
+              <p:nvPr/>
+            </p:nvSpPr>
+            <p:spPr>
+              <a:xfrm>
+                <a:off x="2311" y="5944"/>
+                <a:ext cx="727" cy="727"/>
+              </a:xfrm>
+              <a:prstGeom prst="ellipse">
+                <a:avLst/>
+              </a:prstGeom>
+            </p:spPr>
+            <p:style>
+              <a:lnRef idx="2">
+                <a:schemeClr val="accent1"/>
+              </a:lnRef>
+              <a:fillRef idx="1">
+                <a:schemeClr val="lt1"/>
+              </a:fillRef>
+              <a:effectRef idx="0">
+                <a:schemeClr val="accent1"/>
+              </a:effectRef>
+              <a:fontRef idx="minor">
+                <a:schemeClr val="dk1"/>
+              </a:fontRef>
+            </p:style>
+            <p:txBody>
+              <a:bodyPr rtlCol="0" anchor="ctr"/>
+              <a:p>
+                <a:pPr algn="ctr"/>
+                <a:r>
+                  <a:rPr lang="en-US" altLang="zh-CN"/>
+                  <a:t>5</a:t>
+                </a:r>
+                <a:endParaRPr lang="en-US" altLang="zh-CN"/>
+              </a:p>
+            </p:txBody>
+          </p:sp>
+          <p:sp>
+            <p:nvSpPr>
+              <p:cNvPr id="8" name="椭圆 7"/>
+              <p:cNvSpPr/>
+              <p:nvPr/>
+            </p:nvSpPr>
+            <p:spPr>
+              <a:xfrm>
+                <a:off x="4099" y="5944"/>
+                <a:ext cx="727" cy="727"/>
+              </a:xfrm>
+              <a:prstGeom prst="ellipse">
+                <a:avLst/>
+              </a:prstGeom>
+            </p:spPr>
+            <p:style>
+              <a:lnRef idx="2">
+                <a:schemeClr val="accent1"/>
+              </a:lnRef>
+              <a:fillRef idx="1">
+                <a:schemeClr val="lt1"/>
+              </a:fillRef>
+              <a:effectRef idx="0">
+                <a:schemeClr val="accent1"/>
+              </a:effectRef>
+              <a:fontRef idx="minor">
+                <a:schemeClr val="dk1"/>
+              </a:fontRef>
+            </p:style>
+            <p:txBody>
+              <a:bodyPr rtlCol="0" anchor="ctr"/>
+              <a:p>
+                <a:pPr algn="ctr"/>
+                <a:r>
+                  <a:rPr lang="en-US" altLang="zh-CN"/>
+                  <a:t>6</a:t>
+                </a:r>
+                <a:endParaRPr lang="en-US" altLang="zh-CN"/>
+              </a:p>
+            </p:txBody>
+          </p:sp>
+          <p:sp>
+            <p:nvSpPr>
+              <p:cNvPr id="9" name="椭圆 8"/>
+              <p:cNvSpPr/>
+              <p:nvPr/>
+            </p:nvSpPr>
+            <p:spPr>
+              <a:xfrm>
+                <a:off x="5160" y="4625"/>
+                <a:ext cx="727" cy="727"/>
+              </a:xfrm>
+              <a:prstGeom prst="ellipse">
+                <a:avLst/>
+              </a:prstGeom>
+            </p:spPr>
+            <p:style>
+              <a:lnRef idx="2">
+                <a:schemeClr val="accent1"/>
+              </a:lnRef>
+              <a:fillRef idx="1">
+                <a:schemeClr val="lt1"/>
+              </a:fillRef>
+              <a:effectRef idx="0">
+                <a:schemeClr val="accent1"/>
+              </a:effectRef>
+              <a:fontRef idx="minor">
+                <a:schemeClr val="dk1"/>
+              </a:fontRef>
+            </p:style>
+            <p:txBody>
+              <a:bodyPr rtlCol="0" anchor="ctr"/>
+              <a:p>
+                <a:pPr algn="ctr"/>
+                <a:r>
+                  <a:rPr lang="en-US" altLang="zh-CN"/>
+                  <a:t>4</a:t>
+                </a:r>
+                <a:endParaRPr lang="en-US" altLang="zh-CN"/>
+              </a:p>
+            </p:txBody>
+          </p:sp>
+          <p:sp>
+            <p:nvSpPr>
+              <p:cNvPr id="10" name="椭圆 9"/>
+              <p:cNvSpPr/>
+              <p:nvPr/>
+            </p:nvSpPr>
+            <p:spPr>
+              <a:xfrm>
+                <a:off x="3175" y="4625"/>
+                <a:ext cx="727" cy="727"/>
+              </a:xfrm>
+              <a:prstGeom prst="ellipse">
+                <a:avLst/>
+              </a:prstGeom>
+            </p:spPr>
+            <p:style>
+              <a:lnRef idx="2">
+                <a:schemeClr val="accent1"/>
+              </a:lnRef>
+              <a:fillRef idx="1">
+                <a:schemeClr val="lt1"/>
+              </a:fillRef>
+              <a:effectRef idx="0">
+                <a:schemeClr val="accent1"/>
+              </a:effectRef>
+              <a:fontRef idx="minor">
+                <a:schemeClr val="dk1"/>
+              </a:fontRef>
+            </p:style>
+            <p:txBody>
+              <a:bodyPr rtlCol="0" anchor="ctr"/>
+              <a:p>
+                <a:pPr algn="ctr"/>
+                <a:r>
+                  <a:rPr lang="en-US" altLang="zh-CN"/>
+                  <a:t>3</a:t>
+                </a:r>
+                <a:endParaRPr lang="en-US" altLang="zh-CN"/>
+              </a:p>
+            </p:txBody>
+          </p:sp>
+        </p:grpSp>
+        <p:cxnSp>
+          <p:nvCxnSpPr>
+            <p:cNvPr id="12" name="直接箭头连接符 11"/>
+            <p:cNvCxnSpPr>
+              <a:stCxn id="4" idx="6"/>
+              <a:endCxn id="6" idx="2"/>
+            </p:cNvCxnSpPr>
+            <p:nvPr/>
+          </p:nvCxnSpPr>
+          <p:spPr>
+            <a:xfrm>
+              <a:off x="2664" y="3243"/>
+              <a:ext cx="1061" cy="0"/>
+            </a:xfrm>
+            <a:prstGeom prst="straightConnector1">
+              <a:avLst/>
+            </a:prstGeom>
+            <a:ln w="38100">
+              <a:tailEnd type="arrow"/>
+            </a:ln>
+          </p:spPr>
+          <p:style>
+            <a:lnRef idx="1">
+              <a:schemeClr val="accent1"/>
+            </a:lnRef>
+            <a:fillRef idx="0">
+              <a:schemeClr val="accent1"/>
+            </a:fillRef>
+            <a:effectRef idx="0">
+              <a:schemeClr val="accent1"/>
+            </a:effectRef>
+            <a:fontRef idx="minor">
+              <a:schemeClr val="tx1"/>
+            </a:fontRef>
+          </p:style>
+        </p:cxnSp>
+        <p:cxnSp>
+          <p:nvCxnSpPr>
+            <p:cNvPr id="13" name="直接箭头连接符 12"/>
+            <p:cNvCxnSpPr>
+              <a:stCxn id="6" idx="5"/>
+              <a:endCxn id="9" idx="1"/>
+            </p:cNvCxnSpPr>
+            <p:nvPr/>
+          </p:nvCxnSpPr>
+          <p:spPr>
+            <a:xfrm>
+              <a:off x="4346" y="3500"/>
+              <a:ext cx="546" cy="812"/>
+            </a:xfrm>
+            <a:prstGeom prst="straightConnector1">
+              <a:avLst/>
+            </a:prstGeom>
+            <a:ln w="38100">
+              <a:tailEnd type="arrow"/>
+            </a:ln>
+          </p:spPr>
+          <p:style>
+            <a:lnRef idx="1">
+              <a:schemeClr val="accent1"/>
+            </a:lnRef>
+            <a:fillRef idx="0">
+              <a:schemeClr val="accent1"/>
+            </a:fillRef>
+            <a:effectRef idx="0">
+              <a:schemeClr val="accent1"/>
+            </a:effectRef>
+            <a:fontRef idx="minor">
+              <a:schemeClr val="tx1"/>
+            </a:fontRef>
+          </p:style>
+        </p:cxnSp>
+        <p:cxnSp>
+          <p:nvCxnSpPr>
+            <p:cNvPr id="14" name="直接箭头连接符 13"/>
+            <p:cNvCxnSpPr>
+              <a:stCxn id="6" idx="3"/>
+              <a:endCxn id="10" idx="7"/>
+            </p:cNvCxnSpPr>
+            <p:nvPr/>
+          </p:nvCxnSpPr>
+          <p:spPr>
+            <a:xfrm flipH="1">
+              <a:off x="3422" y="3500"/>
+              <a:ext cx="409" cy="812"/>
+            </a:xfrm>
+            <a:prstGeom prst="straightConnector1">
+              <a:avLst/>
+            </a:prstGeom>
+            <a:ln w="38100">
+              <a:tailEnd type="arrow"/>
+            </a:ln>
+          </p:spPr>
+          <p:style>
+            <a:lnRef idx="1">
+              <a:schemeClr val="accent1"/>
+            </a:lnRef>
+            <a:fillRef idx="0">
+              <a:schemeClr val="accent1"/>
+            </a:fillRef>
+            <a:effectRef idx="0">
+              <a:schemeClr val="accent1"/>
+            </a:effectRef>
+            <a:fontRef idx="minor">
+              <a:schemeClr val="tx1"/>
+            </a:fontRef>
+          </p:style>
+        </p:cxnSp>
+        <p:cxnSp>
+          <p:nvCxnSpPr>
+            <p:cNvPr id="15" name="直接箭头连接符 14"/>
+            <p:cNvCxnSpPr>
+              <a:stCxn id="5" idx="7"/>
+              <a:endCxn id="4" idx="3"/>
+            </p:cNvCxnSpPr>
+            <p:nvPr/>
+          </p:nvCxnSpPr>
+          <p:spPr>
+            <a:xfrm flipV="1">
+              <a:off x="1304" y="3500"/>
+              <a:ext cx="739" cy="812"/>
+            </a:xfrm>
+            <a:prstGeom prst="straightConnector1">
+              <a:avLst/>
+            </a:prstGeom>
+            <a:ln w="38100">
+              <a:tailEnd type="arrow"/>
+            </a:ln>
+          </p:spPr>
+          <p:style>
+            <a:lnRef idx="1">
+              <a:schemeClr val="accent1"/>
+            </a:lnRef>
+            <a:fillRef idx="0">
+              <a:schemeClr val="accent1"/>
+            </a:fillRef>
+            <a:effectRef idx="0">
+              <a:schemeClr val="accent1"/>
+            </a:effectRef>
+            <a:fontRef idx="minor">
+              <a:schemeClr val="tx1"/>
+            </a:fontRef>
+          </p:style>
+        </p:cxnSp>
+        <p:cxnSp>
+          <p:nvCxnSpPr>
+            <p:cNvPr id="16" name="直接箭头连接符 15"/>
+            <p:cNvCxnSpPr>
+              <a:stCxn id="4" idx="5"/>
+              <a:endCxn id="10" idx="1"/>
+            </p:cNvCxnSpPr>
+            <p:nvPr/>
+          </p:nvCxnSpPr>
+          <p:spPr>
+            <a:xfrm>
+              <a:off x="2558" y="3500"/>
+              <a:ext cx="349" cy="812"/>
+            </a:xfrm>
+            <a:prstGeom prst="straightConnector1">
+              <a:avLst/>
+            </a:prstGeom>
+            <a:ln w="38100">
+              <a:tailEnd type="arrow"/>
+            </a:ln>
+          </p:spPr>
+          <p:style>
+            <a:lnRef idx="1">
+              <a:schemeClr val="accent1"/>
+            </a:lnRef>
+            <a:fillRef idx="0">
+              <a:schemeClr val="accent1"/>
+            </a:fillRef>
+            <a:effectRef idx="0">
+              <a:schemeClr val="accent1"/>
+            </a:effectRef>
+            <a:fontRef idx="minor">
+              <a:schemeClr val="tx1"/>
+            </a:fontRef>
+          </p:style>
+        </p:cxnSp>
+        <p:cxnSp>
+          <p:nvCxnSpPr>
+            <p:cNvPr id="17" name="直接箭头连接符 16"/>
+            <p:cNvCxnSpPr>
+              <a:stCxn id="10" idx="2"/>
+              <a:endCxn id="5" idx="6"/>
+            </p:cNvCxnSpPr>
+            <p:nvPr/>
+          </p:nvCxnSpPr>
+          <p:spPr>
+            <a:xfrm flipH="1">
+              <a:off x="1410" y="4570"/>
+              <a:ext cx="1391" cy="0"/>
+            </a:xfrm>
+            <a:prstGeom prst="straightConnector1">
+              <a:avLst/>
+            </a:prstGeom>
+            <a:ln w="38100">
+              <a:tailEnd type="arrow"/>
+            </a:ln>
+          </p:spPr>
+          <p:style>
+            <a:lnRef idx="1">
+              <a:schemeClr val="accent1"/>
+            </a:lnRef>
+            <a:fillRef idx="0">
+              <a:schemeClr val="accent1"/>
+            </a:fillRef>
+            <a:effectRef idx="0">
+              <a:schemeClr val="accent1"/>
+            </a:effectRef>
+            <a:fontRef idx="minor">
+              <a:schemeClr val="tx1"/>
+            </a:fontRef>
+          </p:style>
+        </p:cxnSp>
+        <p:cxnSp>
+          <p:nvCxnSpPr>
+            <p:cNvPr id="18" name="直接箭头连接符 17"/>
+            <p:cNvCxnSpPr>
+              <a:stCxn id="10" idx="3"/>
+              <a:endCxn id="7" idx="7"/>
+            </p:cNvCxnSpPr>
+            <p:nvPr/>
+          </p:nvCxnSpPr>
+          <p:spPr>
+            <a:xfrm flipH="1">
+              <a:off x="2558" y="4827"/>
+              <a:ext cx="349" cy="804"/>
+            </a:xfrm>
+            <a:prstGeom prst="straightConnector1">
+              <a:avLst/>
+            </a:prstGeom>
+            <a:ln w="38100">
+              <a:tailEnd type="arrow"/>
+            </a:ln>
+          </p:spPr>
+          <p:style>
+            <a:lnRef idx="1">
+              <a:schemeClr val="accent1"/>
+            </a:lnRef>
+            <a:fillRef idx="0">
+              <a:schemeClr val="accent1"/>
+            </a:fillRef>
+            <a:effectRef idx="0">
+              <a:schemeClr val="accent1"/>
+            </a:effectRef>
+            <a:fontRef idx="minor">
+              <a:schemeClr val="tx1"/>
+            </a:fontRef>
+          </p:style>
+        </p:cxnSp>
+        <p:cxnSp>
+          <p:nvCxnSpPr>
+            <p:cNvPr id="19" name="直接箭头连接符 18"/>
+            <p:cNvCxnSpPr>
+              <a:stCxn id="10" idx="5"/>
+              <a:endCxn id="8" idx="1"/>
+            </p:cNvCxnSpPr>
+            <p:nvPr/>
+          </p:nvCxnSpPr>
+          <p:spPr>
+            <a:xfrm>
+              <a:off x="3422" y="4827"/>
+              <a:ext cx="409" cy="804"/>
+            </a:xfrm>
+            <a:prstGeom prst="straightConnector1">
+              <a:avLst/>
+            </a:prstGeom>
+            <a:ln w="38100">
+              <a:tailEnd type="arrow"/>
+            </a:ln>
+          </p:spPr>
+          <p:style>
+            <a:lnRef idx="1">
+              <a:schemeClr val="accent1"/>
+            </a:lnRef>
+            <a:fillRef idx="0">
+              <a:schemeClr val="accent1"/>
+            </a:fillRef>
+            <a:effectRef idx="0">
+              <a:schemeClr val="accent1"/>
+            </a:effectRef>
+            <a:fontRef idx="minor">
+              <a:schemeClr val="tx1"/>
+            </a:fontRef>
+          </p:style>
+        </p:cxnSp>
+        <p:cxnSp>
+          <p:nvCxnSpPr>
+            <p:cNvPr id="20" name="直接箭头连接符 19"/>
+            <p:cNvCxnSpPr>
+              <a:stCxn id="8" idx="2"/>
+              <a:endCxn id="7" idx="6"/>
+            </p:cNvCxnSpPr>
+            <p:nvPr/>
+          </p:nvCxnSpPr>
+          <p:spPr>
+            <a:xfrm flipH="1">
+              <a:off x="2664" y="5889"/>
+              <a:ext cx="1061" cy="0"/>
+            </a:xfrm>
+            <a:prstGeom prst="straightConnector1">
+              <a:avLst/>
+            </a:prstGeom>
+            <a:ln w="38100">
+              <a:tailEnd type="arrow"/>
+            </a:ln>
+          </p:spPr>
+          <p:style>
+            <a:lnRef idx="1">
+              <a:schemeClr val="accent1"/>
+            </a:lnRef>
+            <a:fillRef idx="0">
+              <a:schemeClr val="accent1"/>
+            </a:fillRef>
+            <a:effectRef idx="0">
+              <a:schemeClr val="accent1"/>
+            </a:effectRef>
+            <a:fontRef idx="minor">
+              <a:schemeClr val="tx1"/>
+            </a:fontRef>
+          </p:style>
+        </p:cxnSp>
+        <p:cxnSp>
+          <p:nvCxnSpPr>
+            <p:cNvPr id="21" name="直接箭头连接符 20"/>
+            <p:cNvCxnSpPr>
+              <a:stCxn id="9" idx="3"/>
+              <a:endCxn id="8" idx="7"/>
+            </p:cNvCxnSpPr>
+            <p:nvPr/>
+          </p:nvCxnSpPr>
+          <p:spPr>
+            <a:xfrm flipH="1">
+              <a:off x="4346" y="4827"/>
+              <a:ext cx="546" cy="804"/>
+            </a:xfrm>
+            <a:prstGeom prst="straightConnector1">
+              <a:avLst/>
+            </a:prstGeom>
+            <a:ln w="38100">
+              <a:tailEnd type="arrow"/>
+            </a:ln>
+          </p:spPr>
+          <p:style>
+            <a:lnRef idx="1">
+              <a:schemeClr val="accent1"/>
+            </a:lnRef>
+            <a:fillRef idx="0">
+              <a:schemeClr val="accent1"/>
+            </a:fillRef>
+            <a:effectRef idx="0">
+              <a:schemeClr val="accent1"/>
+            </a:effectRef>
+            <a:fontRef idx="minor">
+              <a:schemeClr val="tx1"/>
+            </a:fontRef>
+          </p:style>
+        </p:cxnSp>
+        <p:cxnSp>
+          <p:nvCxnSpPr>
+            <p:cNvPr id="22" name="直接箭头连接符 21"/>
+            <p:cNvCxnSpPr>
+              <a:stCxn id="10" idx="6"/>
+              <a:endCxn id="9" idx="2"/>
+            </p:cNvCxnSpPr>
+            <p:nvPr/>
+          </p:nvCxnSpPr>
+          <p:spPr>
+            <a:xfrm>
+              <a:off x="3528" y="4570"/>
+              <a:ext cx="1258" cy="0"/>
+            </a:xfrm>
+            <a:prstGeom prst="straightConnector1">
+              <a:avLst/>
+            </a:prstGeom>
+            <a:ln w="38100">
+              <a:tailEnd type="arrow"/>
+            </a:ln>
+          </p:spPr>
+          <p:style>
+            <a:lnRef idx="1">
+              <a:schemeClr val="accent1"/>
+            </a:lnRef>
+            <a:fillRef idx="0">
+              <a:schemeClr val="accent1"/>
+            </a:fillRef>
+            <a:effectRef idx="0">
+              <a:schemeClr val="accent1"/>
+            </a:effectRef>
+            <a:fontRef idx="minor">
+              <a:schemeClr val="tx1"/>
+            </a:fontRef>
+          </p:style>
+        </p:cxnSp>
+        <p:cxnSp>
+          <p:nvCxnSpPr>
+            <p:cNvPr id="23" name="直接箭头连接符 22"/>
+            <p:cNvCxnSpPr>
+              <a:stCxn id="5" idx="5"/>
+              <a:endCxn id="7" idx="1"/>
+            </p:cNvCxnSpPr>
+            <p:nvPr/>
+          </p:nvCxnSpPr>
+          <p:spPr>
+            <a:xfrm>
+              <a:off x="1304" y="4827"/>
+              <a:ext cx="739" cy="804"/>
+            </a:xfrm>
+            <a:prstGeom prst="straightConnector1">
+              <a:avLst/>
+            </a:prstGeom>
+            <a:ln w="38100">
+              <a:tailEnd type="arrow"/>
+            </a:ln>
+          </p:spPr>
+          <p:style>
+            <a:lnRef idx="1">
+              <a:schemeClr val="accent1"/>
+            </a:lnRef>
+            <a:fillRef idx="0">
+              <a:schemeClr val="accent1"/>
+            </a:fillRef>
+            <a:effectRef idx="0">
+              <a:schemeClr val="accent1"/>
+            </a:effectRef>
+            <a:fontRef idx="minor">
+              <a:schemeClr val="tx1"/>
+            </a:fontRef>
+          </p:style>
+        </p:cxnSp>
+      </p:grpSp>
     </p:spTree>
   </p:cSld>
   <p:clrMapOvr>

</xml_diff>